<commit_message>
[-] Check in ppt
</commit_message>
<xml_diff>
--- a/TechnoRocks_Amplitude2017.pptx
+++ b/TechnoRocks_Amplitude2017.pptx
@@ -12,8 +12,8 @@
     <p:sldId id="263" r:id="rId3"/>
     <p:sldId id="258" r:id="rId4"/>
     <p:sldId id="259" r:id="rId5"/>
-    <p:sldId id="260" r:id="rId6"/>
-    <p:sldId id="269" r:id="rId7"/>
+    <p:sldId id="269" r:id="rId6"/>
+    <p:sldId id="260" r:id="rId7"/>
     <p:sldId id="266" r:id="rId8"/>
     <p:sldId id="267" r:id="rId9"/>
   </p:sldIdLst>
@@ -2217,7 +2217,7 @@
     </p:spTree>
     <p:extLst>
       <p:ext uri="{BB962C8B-B14F-4D97-AF65-F5344CB8AC3E}">
-        <p14:creationId xmlns:p14="http://schemas.microsoft.com/office/powerpoint/2010/main" val="2318469861"/>
+        <p14:creationId xmlns:p14="http://schemas.microsoft.com/office/powerpoint/2010/main" val="955253732"/>
       </p:ext>
     </p:extLst>
   </p:cSld>
@@ -2406,7 +2406,7 @@
     </p:spTree>
     <p:extLst>
       <p:ext uri="{BB962C8B-B14F-4D97-AF65-F5344CB8AC3E}">
-        <p14:creationId xmlns:p14="http://schemas.microsoft.com/office/powerpoint/2010/main" val="955253732"/>
+        <p14:creationId xmlns:p14="http://schemas.microsoft.com/office/powerpoint/2010/main" val="2318469861"/>
       </p:ext>
     </p:extLst>
   </p:cSld>
@@ -14062,7 +14062,7 @@
               <a:buNone/>
             </a:pPr>
             <a:r>
-              <a:rPr lang="en-US" sz="1600" u="none" strike="noStrike" cap="none" dirty="0">
+              <a:rPr lang="en-US" sz="1600" u="none" strike="noStrike" cap="none" dirty="0" smtClean="0">
                 <a:solidFill>
                   <a:schemeClr val="tx2"/>
                 </a:solidFill>
@@ -14071,27 +14071,26 @@
                 <a:cs typeface="Mark Offc For MC Light" charset="0"/>
                 <a:sym typeface="Calibri"/>
               </a:rPr>
-              <a:t>Hackathon Theme </a:t>
-            </a:r>
-            <a:r>
-              <a:rPr lang="en-US" sz="1600" u="none" strike="noStrike" cap="none" dirty="0" smtClean="0">
-                <a:solidFill>
-                  <a:schemeClr val="tx2"/>
-                </a:solidFill>
-                <a:latin typeface="Mark Offc For MC Light" charset="0"/>
-                <a:ea typeface="Mark Offc For MC Light" charset="0"/>
-                <a:cs typeface="Mark Offc For MC Light" charset="0"/>
-                <a:sym typeface="Calibri"/>
-              </a:rPr>
-              <a:t>:</a:t>
+              <a:t>Hackathon Theme</a:t>
             </a:r>
           </a:p>
           <a:p>
-            <a:pPr>
+            <a:pPr marL="0" marR="0" lvl="0" indent="0" rtl="0">
+              <a:lnSpc>
+                <a:spcPct val="100000"/>
+              </a:lnSpc>
+              <a:spcBef>
+                <a:spcPts val="0"/>
+              </a:spcBef>
+              <a:spcAft>
+                <a:spcPts val="0"/>
+              </a:spcAft>
               <a:buClr>
                 <a:schemeClr val="dk1"/>
               </a:buClr>
               <a:buSzPct val="25000"/>
+              <a:buFont typeface="Calibri"/>
+              <a:buNone/>
             </a:pPr>
             <a:endParaRPr lang="en-US" sz="1600" dirty="0" smtClean="0">
               <a:solidFill>
@@ -14120,8 +14119,45 @@
                 <a:cs typeface="Mark Offc For MC Light" charset="0"/>
                 <a:sym typeface="Calibri"/>
               </a:rPr>
-              <a:t>Create Metadata rules platform</a:t>
+              <a:t>Create Metadata </a:t>
             </a:r>
+            <a:r>
+              <a:rPr lang="en-US" sz="2400" dirty="0" smtClean="0">
+                <a:solidFill>
+                  <a:schemeClr val="tx2"/>
+                </a:solidFill>
+                <a:latin typeface="Mark Offc For MC Light" charset="0"/>
+                <a:ea typeface="Mark Offc For MC Light" charset="0"/>
+                <a:cs typeface="Mark Offc For MC Light" charset="0"/>
+                <a:sym typeface="Calibri"/>
+              </a:rPr>
+              <a:t>driven workflow based rules platform</a:t>
+            </a:r>
+          </a:p>
+          <a:p>
+            <a:pPr>
+              <a:buClr>
+                <a:schemeClr val="dk1"/>
+              </a:buClr>
+              <a:buSzPct val="25000"/>
+            </a:pPr>
+            <a:endParaRPr lang="en-US" sz="2400" dirty="0">
+              <a:solidFill>
+                <a:schemeClr val="tx2"/>
+              </a:solidFill>
+              <a:latin typeface="Mark Offc For MC Light" charset="0"/>
+              <a:ea typeface="Mark Offc For MC Light" charset="0"/>
+              <a:cs typeface="Mark Offc For MC Light" charset="0"/>
+              <a:sym typeface="Calibri"/>
+            </a:endParaRPr>
+          </a:p>
+          <a:p>
+            <a:pPr>
+              <a:buClr>
+                <a:schemeClr val="dk1"/>
+              </a:buClr>
+              <a:buSzPct val="25000"/>
+            </a:pPr>
             <a:endParaRPr lang="en-US" sz="2400" dirty="0">
               <a:solidFill>
                 <a:schemeClr val="tx2"/>
@@ -14453,8 +14489,8 @@
         </p:blipFill>
         <p:spPr>
           <a:xfrm>
-            <a:off x="0" y="112131"/>
-            <a:ext cx="1827085" cy="1470581"/>
+            <a:off x="138425" y="28987"/>
+            <a:ext cx="1454150" cy="1170414"/>
           </a:xfrm>
           <a:prstGeom prst="rect">
             <a:avLst/>
@@ -14469,7 +14505,7 @@
         </p:nvSpPr>
         <p:spPr>
           <a:xfrm>
-            <a:off x="1634598" y="332843"/>
+            <a:off x="1634598" y="229386"/>
             <a:ext cx="7143955" cy="562703"/>
           </a:xfrm>
           <a:prstGeom prst="rect">
@@ -14514,25 +14550,6 @@
               <a:cs typeface="Mark Offc For MC Light" charset="0"/>
               <a:sym typeface="Calibri"/>
             </a:endParaRPr>
-          </a:p>
-        </p:txBody>
-      </p:sp>
-      <p:sp>
-        <p:nvSpPr>
-          <p:cNvPr id="6" name="Title 5"/>
-          <p:cNvSpPr>
-            <a:spLocks noGrp="1"/>
-          </p:cNvSpPr>
-          <p:nvPr>
-            <p:ph type="title"/>
-          </p:nvPr>
-        </p:nvSpPr>
-        <p:spPr/>
-        <p:txBody>
-          <a:bodyPr/>
-          <a:lstStyle/>
-          <a:p>
-            <a:endParaRPr lang="en-US" dirty="0"/>
           </a:p>
         </p:txBody>
       </p:sp>
@@ -14551,23 +14568,47 @@
           <a:bodyPr/>
           <a:lstStyle/>
           <a:p>
-            <a:endParaRPr lang="en-US" dirty="0" smtClean="0"/>
+            <a:endParaRPr lang="en-US" sz="2800" dirty="0">
+              <a:solidFill>
+                <a:schemeClr val="tx2"/>
+              </a:solidFill>
+              <a:latin typeface="Mark Offc For MC Light" charset="0"/>
+              <a:ea typeface="Mark Offc For MC Light" charset="0"/>
+              <a:cs typeface="Mark Offc For MC Light" charset="0"/>
+              <a:sym typeface="Arial"/>
+            </a:endParaRPr>
           </a:p>
           <a:p>
             <a:pPr>
               <a:buClr>
                 <a:schemeClr val="bg1"/>
               </a:buClr>
-              <a:buFont typeface="Wingdings" panose="05000000000000000000" pitchFamily="2" charset="2"/>
-              <a:buChar char="ü"/>
+              <a:buFont typeface="Arial" panose="020B0604020202020204" pitchFamily="34" charset="0"/>
+              <a:buChar char="•"/>
             </a:pPr>
             <a:r>
-              <a:rPr lang="en-US" dirty="0" smtClean="0">
-                <a:solidFill>
-                  <a:schemeClr val="bg1"/>
-                </a:solidFill>
+              <a:rPr lang="en-US" sz="2600" dirty="0" smtClean="0">
+                <a:solidFill>
+                  <a:schemeClr val="tx2"/>
+                </a:solidFill>
+                <a:latin typeface="Mark Offc For MC Light" charset="0"/>
+                <a:ea typeface="Mark Offc For MC Light" charset="0"/>
+                <a:cs typeface="Mark Offc For MC Light" charset="0"/>
+                <a:sym typeface="Arial"/>
               </a:rPr>
-              <a:t>Change rules on runtime</a:t>
+              <a:t> Change </a:t>
+            </a:r>
+            <a:r>
+              <a:rPr lang="en-US" sz="2600" dirty="0">
+                <a:solidFill>
+                  <a:schemeClr val="tx2"/>
+                </a:solidFill>
+                <a:latin typeface="Mark Offc For MC Light" charset="0"/>
+                <a:ea typeface="Mark Offc For MC Light" charset="0"/>
+                <a:cs typeface="Mark Offc For MC Light" charset="0"/>
+                <a:sym typeface="Arial"/>
+              </a:rPr>
+              <a:t>business rules at runtime</a:t>
             </a:r>
           </a:p>
           <a:p>
@@ -14575,38 +14616,32 @@
               <a:buClr>
                 <a:schemeClr val="bg1"/>
               </a:buClr>
-              <a:buFont typeface="Wingdings" panose="05000000000000000000" pitchFamily="2" charset="2"/>
-              <a:buChar char="ü"/>
+              <a:buFont typeface="Arial" panose="020B0604020202020204" pitchFamily="34" charset="0"/>
+              <a:buChar char="•"/>
             </a:pPr>
             <a:r>
-              <a:rPr lang="en-US" dirty="0">
-                <a:solidFill>
-                  <a:schemeClr val="bg1"/>
-                </a:solidFill>
+              <a:rPr lang="en-US" sz="2600" dirty="0" smtClean="0">
+                <a:solidFill>
+                  <a:schemeClr val="tx2"/>
+                </a:solidFill>
+                <a:latin typeface="Mark Offc For MC Light" charset="0"/>
+                <a:ea typeface="Mark Offc For MC Light" charset="0"/>
+                <a:cs typeface="Mark Offc For MC Light" charset="0"/>
+                <a:sym typeface="Arial"/>
               </a:rPr>
-              <a:t>GUI based application to define rules </a:t>
+              <a:t> GUI </a:t>
             </a:r>
-            <a:endParaRPr lang="en-US" dirty="0" smtClean="0">
-              <a:solidFill>
-                <a:schemeClr val="bg1"/>
-              </a:solidFill>
-            </a:endParaRPr>
-          </a:p>
-          <a:p>
-            <a:pPr>
-              <a:buClr>
-                <a:schemeClr val="bg1"/>
-              </a:buClr>
-              <a:buFont typeface="Wingdings" panose="05000000000000000000" pitchFamily="2" charset="2"/>
-              <a:buChar char="ü"/>
-            </a:pPr>
             <a:r>
-              <a:rPr lang="en-US" dirty="0" smtClean="0">
-                <a:solidFill>
-                  <a:schemeClr val="bg1"/>
-                </a:solidFill>
+              <a:rPr lang="en-US" sz="2600" dirty="0">
+                <a:solidFill>
+                  <a:schemeClr val="tx2"/>
+                </a:solidFill>
+                <a:latin typeface="Mark Offc For MC Light" charset="0"/>
+                <a:ea typeface="Mark Offc For MC Light" charset="0"/>
+                <a:cs typeface="Mark Offc For MC Light" charset="0"/>
+                <a:sym typeface="Arial"/>
               </a:rPr>
-              <a:t>Capability to test defined rules</a:t>
+              <a:t>based application to define rules </a:t>
             </a:r>
           </a:p>
           <a:p>
@@ -14614,16 +14649,32 @@
               <a:buClr>
                 <a:schemeClr val="bg1"/>
               </a:buClr>
-              <a:buFont typeface="Wingdings" panose="05000000000000000000" pitchFamily="2" charset="2"/>
-              <a:buChar char="ü"/>
+              <a:buFont typeface="Arial" panose="020B0604020202020204" pitchFamily="34" charset="0"/>
+              <a:buChar char="•"/>
             </a:pPr>
             <a:r>
-              <a:rPr lang="en-US" dirty="0" smtClean="0">
-                <a:solidFill>
-                  <a:schemeClr val="bg1"/>
-                </a:solidFill>
+              <a:rPr lang="en-US" sz="2600" dirty="0" smtClean="0">
+                <a:solidFill>
+                  <a:schemeClr val="tx2"/>
+                </a:solidFill>
+                <a:latin typeface="Mark Offc For MC Light" charset="0"/>
+                <a:ea typeface="Mark Offc For MC Light" charset="0"/>
+                <a:cs typeface="Mark Offc For MC Light" charset="0"/>
+                <a:sym typeface="Arial"/>
               </a:rPr>
-              <a:t>Set validity for rules</a:t>
+              <a:t> Capability </a:t>
+            </a:r>
+            <a:r>
+              <a:rPr lang="en-US" sz="2600" dirty="0">
+                <a:solidFill>
+                  <a:schemeClr val="tx2"/>
+                </a:solidFill>
+                <a:latin typeface="Mark Offc For MC Light" charset="0"/>
+                <a:ea typeface="Mark Offc For MC Light" charset="0"/>
+                <a:cs typeface="Mark Offc For MC Light" charset="0"/>
+                <a:sym typeface="Arial"/>
+              </a:rPr>
+              <a:t>to test defined rules</a:t>
             </a:r>
           </a:p>
           <a:p>
@@ -14631,17 +14682,63 @@
               <a:buClr>
                 <a:schemeClr val="bg1"/>
               </a:buClr>
-              <a:buFont typeface="Wingdings" panose="05000000000000000000" pitchFamily="2" charset="2"/>
-              <a:buChar char="ü"/>
+              <a:buFont typeface="Arial" panose="020B0604020202020204" pitchFamily="34" charset="0"/>
+              <a:buChar char="•"/>
             </a:pPr>
             <a:r>
-              <a:rPr lang="en-US" dirty="0" smtClean="0">
-                <a:solidFill>
-                  <a:schemeClr val="bg1"/>
-                </a:solidFill>
+              <a:rPr lang="en-US" sz="2600" dirty="0" smtClean="0">
+                <a:solidFill>
+                  <a:schemeClr val="tx2"/>
+                </a:solidFill>
+                <a:latin typeface="Mark Offc For MC Light" charset="0"/>
+                <a:ea typeface="Mark Offc For MC Light" charset="0"/>
+                <a:cs typeface="Mark Offc For MC Light" charset="0"/>
+                <a:sym typeface="Arial"/>
               </a:rPr>
-              <a:t>Scalability</a:t>
+              <a:t> Set </a:t>
             </a:r>
+            <a:r>
+              <a:rPr lang="en-US" sz="2600" dirty="0">
+                <a:solidFill>
+                  <a:schemeClr val="tx2"/>
+                </a:solidFill>
+                <a:latin typeface="Mark Offc For MC Light" charset="0"/>
+                <a:ea typeface="Mark Offc For MC Light" charset="0"/>
+                <a:cs typeface="Mark Offc For MC Light" charset="0"/>
+                <a:sym typeface="Arial"/>
+              </a:rPr>
+              <a:t>validity for rules</a:t>
+            </a:r>
+          </a:p>
+          <a:p>
+            <a:pPr>
+              <a:buClr>
+                <a:schemeClr val="bg1"/>
+              </a:buClr>
+              <a:buFont typeface="Arial" panose="020B0604020202020204" pitchFamily="34" charset="0"/>
+              <a:buChar char="•"/>
+            </a:pPr>
+            <a:r>
+              <a:rPr lang="en-US" sz="2600" dirty="0" smtClean="0">
+                <a:solidFill>
+                  <a:schemeClr val="tx2"/>
+                </a:solidFill>
+                <a:latin typeface="Mark Offc For MC Light" charset="0"/>
+                <a:ea typeface="Mark Offc For MC Light" charset="0"/>
+                <a:cs typeface="Mark Offc For MC Light" charset="0"/>
+                <a:sym typeface="Arial"/>
+              </a:rPr>
+              <a:t> Scalability</a:t>
+            </a:r>
+            <a:endParaRPr lang="en-US" sz="2600" dirty="0">
+              <a:solidFill>
+                <a:schemeClr val="tx2"/>
+              </a:solidFill>
+              <a:latin typeface="Mark Offc For MC Light" charset="0"/>
+              <a:ea typeface="Mark Offc For MC Light" charset="0"/>
+              <a:cs typeface="Mark Offc For MC Light" charset="0"/>
+              <a:sym typeface="Arial"/>
+            </a:endParaRPr>
           </a:p>
         </p:txBody>
       </p:sp>
@@ -14813,8 +14910,8 @@
         </p:blipFill>
         <p:spPr>
           <a:xfrm>
-            <a:off x="0" y="126229"/>
-            <a:ext cx="1866507" cy="1502311"/>
+            <a:off x="-165226" y="68023"/>
+            <a:ext cx="1215222" cy="978106"/>
           </a:xfrm>
           <a:prstGeom prst="rect">
             <a:avLst/>
@@ -14823,14 +14920,314 @@
       </p:pic>
       <p:sp>
         <p:nvSpPr>
+          <p:cNvPr id="6" name="Text Placeholder 5"/>
+          <p:cNvSpPr>
+            <a:spLocks noGrp="1"/>
+          </p:cNvSpPr>
+          <p:nvPr>
+            <p:ph type="body" idx="1"/>
+          </p:nvPr>
+        </p:nvSpPr>
+        <p:spPr>
+          <a:xfrm>
+            <a:off x="627330" y="1046129"/>
+            <a:ext cx="8229600" cy="3600449"/>
+          </a:xfrm>
+        </p:spPr>
+        <p:txBody>
+          <a:bodyPr/>
+          <a:lstStyle/>
+          <a:p>
+            <a:pPr>
+              <a:buClr>
+                <a:schemeClr val="bg1"/>
+              </a:buClr>
+              <a:buFont typeface="Arial" panose="020B0604020202020204" pitchFamily="34" charset="0"/>
+              <a:buChar char="•"/>
+            </a:pPr>
+            <a:r>
+              <a:rPr lang="en-US" sz="2400" dirty="0" smtClean="0">
+                <a:solidFill>
+                  <a:schemeClr val="tx2"/>
+                </a:solidFill>
+                <a:latin typeface="Mark Offc For MC Light" charset="0"/>
+                <a:ea typeface="Mark Offc For MC Light" charset="0"/>
+                <a:cs typeface="Mark Offc For MC Light" charset="0"/>
+                <a:sym typeface="Arial"/>
+              </a:rPr>
+              <a:t> </a:t>
+            </a:r>
+            <a:r>
+              <a:rPr lang="en-US" sz="2200" dirty="0" smtClean="0">
+                <a:solidFill>
+                  <a:schemeClr val="tx2"/>
+                </a:solidFill>
+                <a:latin typeface="Mark Offc For MC Light" charset="0"/>
+                <a:ea typeface="Mark Offc For MC Light" charset="0"/>
+                <a:cs typeface="Mark Offc For MC Light" charset="0"/>
+                <a:sym typeface="Arial"/>
+              </a:rPr>
+              <a:t>Dynamic development and deployment of rules</a:t>
+            </a:r>
+          </a:p>
+          <a:p>
+            <a:pPr>
+              <a:buClr>
+                <a:schemeClr val="bg1"/>
+              </a:buClr>
+              <a:buFont typeface="Arial" panose="020B0604020202020204" pitchFamily="34" charset="0"/>
+              <a:buChar char="•"/>
+            </a:pPr>
+            <a:r>
+              <a:rPr lang="en-US" sz="2200" dirty="0" smtClean="0">
+                <a:solidFill>
+                  <a:schemeClr val="tx2"/>
+                </a:solidFill>
+                <a:latin typeface="Mark Offc For MC Light" charset="0"/>
+                <a:ea typeface="Mark Offc For MC Light" charset="0"/>
+                <a:cs typeface="Mark Offc For MC Light" charset="0"/>
+                <a:sym typeface="Arial"/>
+              </a:rPr>
+              <a:t> Implementation of Domain Specific Language</a:t>
+            </a:r>
+          </a:p>
+          <a:p>
+            <a:pPr lvl="1">
+              <a:buClr>
+                <a:schemeClr val="bg1"/>
+              </a:buClr>
+              <a:buFont typeface="Arial" panose="020B0604020202020204" pitchFamily="34" charset="0"/>
+              <a:buChar char="•"/>
+            </a:pPr>
+            <a:r>
+              <a:rPr lang="en-US" sz="2000" dirty="0">
+                <a:solidFill>
+                  <a:schemeClr val="tx2"/>
+                </a:solidFill>
+                <a:latin typeface="Mark Offc For MC Light" charset="0"/>
+                <a:ea typeface="Mark Offc For MC Light" charset="0"/>
+                <a:cs typeface="Mark Offc For MC Light" charset="0"/>
+                <a:sym typeface="Arial"/>
+              </a:rPr>
+              <a:t> </a:t>
+            </a:r>
+            <a:r>
+              <a:rPr lang="en-US" sz="1800" dirty="0" smtClean="0">
+                <a:solidFill>
+                  <a:schemeClr val="tx2"/>
+                </a:solidFill>
+                <a:latin typeface="Mark Offc For MC Light" charset="0"/>
+                <a:ea typeface="Mark Offc For MC Light" charset="0"/>
+                <a:cs typeface="Mark Offc For MC Light" charset="0"/>
+                <a:sym typeface="Arial"/>
+              </a:rPr>
+              <a:t>No exposure to any coding language is required.</a:t>
+            </a:r>
+          </a:p>
+          <a:p>
+            <a:pPr lvl="1">
+              <a:buClr>
+                <a:schemeClr val="bg1"/>
+              </a:buClr>
+              <a:buFont typeface="Arial" panose="020B0604020202020204" pitchFamily="34" charset="0"/>
+              <a:buChar char="•"/>
+            </a:pPr>
+            <a:r>
+              <a:rPr lang="en-US" sz="1800" dirty="0" smtClean="0">
+                <a:solidFill>
+                  <a:schemeClr val="tx2"/>
+                </a:solidFill>
+                <a:latin typeface="Mark Offc For MC Light" charset="0"/>
+                <a:ea typeface="Mark Offc For MC Light" charset="0"/>
+                <a:cs typeface="Mark Offc For MC Light" charset="0"/>
+                <a:sym typeface="Arial"/>
+              </a:rPr>
+              <a:t> Zero Coding approach</a:t>
+            </a:r>
+          </a:p>
+          <a:p>
+            <a:pPr>
+              <a:buClr>
+                <a:schemeClr val="bg1"/>
+              </a:buClr>
+              <a:buFont typeface="Arial" panose="020B0604020202020204" pitchFamily="34" charset="0"/>
+              <a:buChar char="•"/>
+            </a:pPr>
+            <a:r>
+              <a:rPr lang="en-US" sz="2400" dirty="0" smtClean="0">
+                <a:solidFill>
+                  <a:schemeClr val="tx2"/>
+                </a:solidFill>
+                <a:latin typeface="Mark Offc For MC Light" charset="0"/>
+                <a:ea typeface="Mark Offc For MC Light" charset="0"/>
+                <a:cs typeface="Mark Offc For MC Light" charset="0"/>
+                <a:sym typeface="Arial"/>
+              </a:rPr>
+              <a:t> </a:t>
+            </a:r>
+            <a:r>
+              <a:rPr lang="en-US" sz="2200" dirty="0" smtClean="0">
+                <a:solidFill>
+                  <a:schemeClr val="tx2"/>
+                </a:solidFill>
+                <a:latin typeface="Mark Offc For MC Light" charset="0"/>
+                <a:ea typeface="Mark Offc For MC Light" charset="0"/>
+                <a:cs typeface="Mark Offc For MC Light" charset="0"/>
+                <a:sym typeface="Arial"/>
+              </a:rPr>
+              <a:t>Zero Downtime</a:t>
+            </a:r>
+            <a:endParaRPr lang="en-US" sz="2200" dirty="0">
+              <a:solidFill>
+                <a:schemeClr val="tx2"/>
+              </a:solidFill>
+              <a:latin typeface="Mark Offc For MC Light" charset="0"/>
+              <a:ea typeface="Mark Offc For MC Light" charset="0"/>
+              <a:cs typeface="Mark Offc For MC Light" charset="0"/>
+              <a:sym typeface="Arial"/>
+            </a:endParaRPr>
+          </a:p>
+          <a:p>
+            <a:pPr>
+              <a:buClr>
+                <a:schemeClr val="bg1"/>
+              </a:buClr>
+              <a:buFont typeface="Arial" panose="020B0604020202020204" pitchFamily="34" charset="0"/>
+              <a:buChar char="•"/>
+            </a:pPr>
+            <a:r>
+              <a:rPr lang="en-US" sz="2200" dirty="0" smtClean="0">
+                <a:solidFill>
+                  <a:schemeClr val="tx2"/>
+                </a:solidFill>
+                <a:latin typeface="Mark Offc For MC Light" charset="0"/>
+                <a:ea typeface="Mark Offc For MC Light" charset="0"/>
+                <a:cs typeface="Mark Offc For MC Light" charset="0"/>
+                <a:sym typeface="Arial"/>
+              </a:rPr>
+              <a:t> Simulation </a:t>
+            </a:r>
+            <a:r>
+              <a:rPr lang="en-US" sz="2200" dirty="0">
+                <a:solidFill>
+                  <a:schemeClr val="tx2"/>
+                </a:solidFill>
+                <a:latin typeface="Mark Offc For MC Light" charset="0"/>
+                <a:ea typeface="Mark Offc For MC Light" charset="0"/>
+                <a:cs typeface="Mark Offc For MC Light" charset="0"/>
+                <a:sym typeface="Arial"/>
+              </a:rPr>
+              <a:t>using REST </a:t>
+            </a:r>
+            <a:r>
+              <a:rPr lang="en-US" sz="2200" dirty="0" smtClean="0">
+                <a:solidFill>
+                  <a:schemeClr val="tx2"/>
+                </a:solidFill>
+                <a:latin typeface="Mark Offc For MC Light" charset="0"/>
+                <a:ea typeface="Mark Offc For MC Light" charset="0"/>
+                <a:cs typeface="Mark Offc For MC Light" charset="0"/>
+                <a:sym typeface="Arial"/>
+              </a:rPr>
+              <a:t>Service. </a:t>
+            </a:r>
+          </a:p>
+          <a:p>
+            <a:pPr>
+              <a:buClr>
+                <a:schemeClr val="bg1"/>
+              </a:buClr>
+              <a:buFont typeface="Arial" panose="020B0604020202020204" pitchFamily="34" charset="0"/>
+              <a:buChar char="•"/>
+            </a:pPr>
+            <a:r>
+              <a:rPr lang="en-US" sz="2200" dirty="0">
+                <a:solidFill>
+                  <a:schemeClr val="tx2"/>
+                </a:solidFill>
+                <a:latin typeface="Mark Offc For MC Light" charset="0"/>
+                <a:ea typeface="Mark Offc For MC Light" charset="0"/>
+                <a:cs typeface="Mark Offc For MC Light" charset="0"/>
+                <a:sym typeface="Arial"/>
+              </a:rPr>
+              <a:t> </a:t>
+            </a:r>
+            <a:r>
+              <a:rPr lang="en-US" sz="2200" dirty="0" smtClean="0">
+                <a:solidFill>
+                  <a:schemeClr val="tx2"/>
+                </a:solidFill>
+                <a:latin typeface="Mark Offc For MC Light" charset="0"/>
+                <a:ea typeface="Mark Offc For MC Light" charset="0"/>
+                <a:cs typeface="Mark Offc For MC Light" charset="0"/>
+                <a:sym typeface="Arial"/>
+              </a:rPr>
+              <a:t>Easy maintenance &amp; scalability.</a:t>
+            </a:r>
+            <a:endParaRPr lang="en-US" sz="2200" dirty="0">
+              <a:solidFill>
+                <a:schemeClr val="tx2"/>
+              </a:solidFill>
+              <a:latin typeface="Mark Offc For MC Light" charset="0"/>
+              <a:ea typeface="Mark Offc For MC Light" charset="0"/>
+              <a:cs typeface="Mark Offc For MC Light" charset="0"/>
+              <a:sym typeface="Arial"/>
+            </a:endParaRPr>
+          </a:p>
+          <a:p>
+            <a:pPr>
+              <a:buClr>
+                <a:schemeClr val="bg1"/>
+              </a:buClr>
+              <a:buFont typeface="Arial" panose="020B0604020202020204" pitchFamily="34" charset="0"/>
+              <a:buChar char="•"/>
+            </a:pPr>
+            <a:r>
+              <a:rPr lang="en-US" sz="2200" dirty="0" smtClean="0">
+                <a:solidFill>
+                  <a:schemeClr val="tx2"/>
+                </a:solidFill>
+                <a:latin typeface="Mark Offc For MC Light" charset="0"/>
+                <a:ea typeface="Mark Offc For MC Light" charset="0"/>
+                <a:cs typeface="Mark Offc For MC Light" charset="0"/>
+                <a:sym typeface="Arial"/>
+              </a:rPr>
+              <a:t> Time-based </a:t>
+            </a:r>
+            <a:r>
+              <a:rPr lang="en-US" sz="2200" dirty="0">
+                <a:solidFill>
+                  <a:schemeClr val="tx2"/>
+                </a:solidFill>
+                <a:latin typeface="Mark Offc For MC Light" charset="0"/>
+                <a:ea typeface="Mark Offc For MC Light" charset="0"/>
+                <a:cs typeface="Mark Offc For MC Light" charset="0"/>
+                <a:sym typeface="Arial"/>
+              </a:rPr>
+              <a:t>Rules</a:t>
+            </a:r>
+            <a:endParaRPr lang="en-US" sz="2200" dirty="0">
+              <a:solidFill>
+                <a:schemeClr val="tx2"/>
+              </a:solidFill>
+              <a:latin typeface="Mark Offc For MC Light" charset="0"/>
+              <a:ea typeface="Mark Offc For MC Light" charset="0"/>
+              <a:cs typeface="Mark Offc For MC Light" charset="0"/>
+              <a:sym typeface="Arial"/>
+            </a:endParaRPr>
+          </a:p>
+        </p:txBody>
+      </p:sp>
+      <p:sp>
+        <p:nvSpPr>
           <p:cNvPr id="9" name="Shape 116"/>
           <p:cNvSpPr/>
           <p:nvPr/>
         </p:nvSpPr>
         <p:spPr>
           <a:xfrm>
-            <a:off x="1556115" y="260868"/>
-            <a:ext cx="7300815" cy="817624"/>
+            <a:off x="831851" y="167044"/>
+            <a:ext cx="8312149" cy="780064"/>
           </a:xfrm>
           <a:prstGeom prst="rect">
             <a:avLst/>
@@ -14854,7 +15251,7 @@
               <a:buNone/>
             </a:pPr>
             <a:r>
-              <a:rPr lang="en-US" sz="2400" dirty="0" smtClean="0">
+              <a:rPr lang="en-US" sz="2800" dirty="0" smtClean="0">
                 <a:solidFill>
                   <a:schemeClr val="tx2"/>
                 </a:solidFill>
@@ -14865,7 +15262,7 @@
               </a:rPr>
               <a:t>What is Your Solution to Address Pain Point(s)?</a:t>
             </a:r>
-            <a:endParaRPr lang="en-US" sz="2400" dirty="0">
+            <a:endParaRPr lang="en-US" sz="2800" dirty="0">
               <a:solidFill>
                 <a:schemeClr val="tx2"/>
               </a:solidFill>
@@ -14873,146 +15270,6 @@
               <a:ea typeface="Mark Offc For MC Light" charset="0"/>
               <a:cs typeface="Mark Offc For MC Light" charset="0"/>
               <a:sym typeface="Calibri"/>
-            </a:endParaRPr>
-          </a:p>
-        </p:txBody>
-      </p:sp>
-      <p:sp>
-        <p:nvSpPr>
-          <p:cNvPr id="5" name="Title 4"/>
-          <p:cNvSpPr>
-            <a:spLocks noGrp="1"/>
-          </p:cNvSpPr>
-          <p:nvPr>
-            <p:ph type="title"/>
-          </p:nvPr>
-        </p:nvSpPr>
-        <p:spPr/>
-        <p:txBody>
-          <a:bodyPr/>
-          <a:lstStyle/>
-          <a:p>
-            <a:endParaRPr lang="en-US" dirty="0"/>
-          </a:p>
-        </p:txBody>
-      </p:sp>
-      <p:sp>
-        <p:nvSpPr>
-          <p:cNvPr id="6" name="Text Placeholder 5"/>
-          <p:cNvSpPr>
-            <a:spLocks noGrp="1"/>
-          </p:cNvSpPr>
-          <p:nvPr>
-            <p:ph type="body" idx="1"/>
-          </p:nvPr>
-        </p:nvSpPr>
-        <p:spPr/>
-        <p:txBody>
-          <a:bodyPr/>
-          <a:lstStyle/>
-          <a:p>
-            <a:pPr>
-              <a:buFont typeface="Wingdings" panose="05000000000000000000" pitchFamily="2" charset="2"/>
-              <a:buChar char="ü"/>
-            </a:pPr>
-            <a:endParaRPr lang="en-US" dirty="0" smtClean="0">
-              <a:solidFill>
-                <a:schemeClr val="bg1"/>
-              </a:solidFill>
-            </a:endParaRPr>
-          </a:p>
-          <a:p>
-            <a:pPr>
-              <a:buClr>
-                <a:schemeClr val="bg1"/>
-              </a:buClr>
-              <a:buFont typeface="Wingdings" panose="05000000000000000000" pitchFamily="2" charset="2"/>
-              <a:buChar char="ü"/>
-            </a:pPr>
-            <a:r>
-              <a:rPr lang="en-US" dirty="0" smtClean="0">
-                <a:solidFill>
-                  <a:schemeClr val="bg1"/>
-                </a:solidFill>
-              </a:rPr>
-              <a:t> Zero </a:t>
-            </a:r>
-            <a:r>
-              <a:rPr lang="en-US" dirty="0">
-                <a:solidFill>
-                  <a:schemeClr val="bg1"/>
-                </a:solidFill>
-              </a:rPr>
-              <a:t>Downtime</a:t>
-            </a:r>
-          </a:p>
-          <a:p>
-            <a:pPr>
-              <a:buClr>
-                <a:schemeClr val="bg1"/>
-              </a:buClr>
-              <a:buFont typeface="Wingdings" panose="05000000000000000000" pitchFamily="2" charset="2"/>
-              <a:buChar char="ü"/>
-            </a:pPr>
-            <a:r>
-              <a:rPr lang="en-US" dirty="0" smtClean="0">
-                <a:solidFill>
-                  <a:schemeClr val="bg1"/>
-                </a:solidFill>
-              </a:rPr>
-              <a:t> Zero </a:t>
-            </a:r>
-            <a:r>
-              <a:rPr lang="en-US" dirty="0">
-                <a:solidFill>
-                  <a:schemeClr val="bg1"/>
-                </a:solidFill>
-              </a:rPr>
-              <a:t>Coding</a:t>
-            </a:r>
-          </a:p>
-          <a:p>
-            <a:pPr>
-              <a:buClr>
-                <a:schemeClr val="bg1"/>
-              </a:buClr>
-              <a:buFont typeface="Wingdings" panose="05000000000000000000" pitchFamily="2" charset="2"/>
-              <a:buChar char="ü"/>
-            </a:pPr>
-            <a:r>
-              <a:rPr lang="en-US" dirty="0" smtClean="0">
-                <a:solidFill>
-                  <a:schemeClr val="bg1"/>
-                </a:solidFill>
-              </a:rPr>
-              <a:t> Simulation using REST Service</a:t>
-            </a:r>
-            <a:endParaRPr lang="en-US" dirty="0">
-              <a:solidFill>
-                <a:schemeClr val="bg1"/>
-              </a:solidFill>
-            </a:endParaRPr>
-          </a:p>
-          <a:p>
-            <a:pPr>
-              <a:buClr>
-                <a:schemeClr val="bg1"/>
-              </a:buClr>
-              <a:buFont typeface="Wingdings" panose="05000000000000000000" pitchFamily="2" charset="2"/>
-              <a:buChar char="ü"/>
-            </a:pPr>
-            <a:r>
-              <a:rPr lang="en-US" dirty="0" smtClean="0">
-                <a:solidFill>
-                  <a:schemeClr val="bg1"/>
-                </a:solidFill>
-              </a:rPr>
-              <a:t> Time-based Rules</a:t>
-            </a:r>
-            <a:endParaRPr lang="en-US" dirty="0">
-              <a:solidFill>
-                <a:schemeClr val="bg1"/>
-              </a:solidFill>
             </a:endParaRPr>
           </a:p>
         </p:txBody>
@@ -15074,7 +15331,394 @@
         </p:nvSpPr>
         <p:spPr>
           <a:xfrm>
-            <a:off x="1527685" y="521471"/>
+            <a:off x="1514985" y="233237"/>
+            <a:ext cx="7216266" cy="562703"/>
+          </a:xfrm>
+          <a:prstGeom prst="rect">
+            <a:avLst/>
+          </a:prstGeom>
+          <a:noFill/>
+          <a:ln>
+            <a:noFill/>
+          </a:ln>
+        </p:spPr>
+        <p:txBody>
+          <a:bodyPr lIns="65250" tIns="65250" rIns="65250" bIns="65250" anchor="ctr" anchorCtr="0">
+            <a:noAutofit/>
+          </a:bodyPr>
+          <a:lstStyle/>
+          <a:p>
+            <a:pPr marL="0" marR="0" lvl="0" indent="0" rtl="0">
+              <a:spcBef>
+                <a:spcPts val="0"/>
+              </a:spcBef>
+              <a:buSzPct val="25000"/>
+              <a:buNone/>
+            </a:pPr>
+            <a:r>
+              <a:rPr lang="en-US" sz="2800" dirty="0" smtClean="0">
+                <a:solidFill>
+                  <a:schemeClr val="tx2"/>
+                </a:solidFill>
+                <a:latin typeface="Mark Offc For MC Light" charset="0"/>
+                <a:ea typeface="Mark Offc For MC Light" charset="0"/>
+                <a:cs typeface="Mark Offc For MC Light" charset="0"/>
+                <a:sym typeface="Calibri"/>
+              </a:rPr>
+              <a:t>Where this can be implemented?</a:t>
+            </a:r>
+            <a:endParaRPr lang="en-US" sz="2800" dirty="0">
+              <a:solidFill>
+                <a:schemeClr val="tx2"/>
+              </a:solidFill>
+              <a:latin typeface="Mark Offc For MC Light" charset="0"/>
+              <a:ea typeface="Mark Offc For MC Light" charset="0"/>
+              <a:cs typeface="Mark Offc For MC Light" charset="0"/>
+              <a:sym typeface="Calibri"/>
+            </a:endParaRPr>
+          </a:p>
+        </p:txBody>
+      </p:sp>
+      <p:sp>
+        <p:nvSpPr>
+          <p:cNvPr id="135" name="Shape 135"/>
+          <p:cNvSpPr/>
+          <p:nvPr/>
+        </p:nvSpPr>
+        <p:spPr>
+          <a:xfrm>
+            <a:off x="491313" y="1203245"/>
+            <a:ext cx="7738288" cy="3550595"/>
+          </a:xfrm>
+          <a:prstGeom prst="rect">
+            <a:avLst/>
+          </a:prstGeom>
+          <a:noFill/>
+          <a:ln>
+            <a:noFill/>
+          </a:ln>
+        </p:spPr>
+        <p:txBody>
+          <a:bodyPr lIns="65250" tIns="65250" rIns="65250" bIns="65250" anchor="t" anchorCtr="0">
+            <a:noAutofit/>
+          </a:bodyPr>
+          <a:lstStyle/>
+          <a:p>
+            <a:pPr lvl="0">
+              <a:buSzPct val="25000"/>
+            </a:pPr>
+            <a:endParaRPr lang="en-US" sz="1600" dirty="0" smtClean="0">
+              <a:solidFill>
+                <a:schemeClr val="tx2"/>
+              </a:solidFill>
+              <a:latin typeface="Mark Offc For MC Light" charset="0"/>
+              <a:ea typeface="Mark Offc For MC Light" charset="0"/>
+              <a:cs typeface="Mark Offc For MC Light" charset="0"/>
+              <a:sym typeface="Calibri"/>
+            </a:endParaRPr>
+          </a:p>
+          <a:p>
+            <a:pPr marL="0" marR="0" lvl="0" indent="0" rtl="0">
+              <a:spcBef>
+                <a:spcPts val="0"/>
+              </a:spcBef>
+              <a:buNone/>
+            </a:pPr>
+            <a:endParaRPr sz="1100" dirty="0">
+              <a:solidFill>
+                <a:schemeClr val="tx2"/>
+              </a:solidFill>
+              <a:latin typeface="Mark Offc For MC Light" charset="0"/>
+              <a:ea typeface="Mark Offc For MC Light" charset="0"/>
+              <a:cs typeface="Mark Offc For MC Light" charset="0"/>
+              <a:sym typeface="Calibri"/>
+            </a:endParaRPr>
+          </a:p>
+        </p:txBody>
+      </p:sp>
+      <p:pic>
+        <p:nvPicPr>
+          <p:cNvPr id="7" name="Picture 6"/>
+          <p:cNvPicPr>
+            <a:picLocks noChangeAspect="1"/>
+          </p:cNvPicPr>
+          <p:nvPr/>
+        </p:nvPicPr>
+        <p:blipFill>
+          <a:blip r:embed="rId4">
+            <a:extLst>
+              <a:ext uri="{28A0092B-C50C-407E-A947-70E740481C1C}">
+                <a14:useLocalDpi xmlns:a14="http://schemas.microsoft.com/office/drawing/2010/main" val="0"/>
+              </a:ext>
+            </a:extLst>
+          </a:blip>
+          <a:stretch>
+            <a:fillRect/>
+          </a:stretch>
+        </p:blipFill>
+        <p:spPr>
+          <a:xfrm>
+            <a:off x="222080" y="4753840"/>
+            <a:ext cx="993143" cy="227996"/>
+          </a:xfrm>
+          <a:prstGeom prst="rect">
+            <a:avLst/>
+          </a:prstGeom>
+        </p:spPr>
+      </p:pic>
+      <p:pic>
+        <p:nvPicPr>
+          <p:cNvPr id="8" name="Shape 110"/>
+          <p:cNvPicPr preferRelativeResize="0"/>
+          <p:nvPr/>
+        </p:nvPicPr>
+        <p:blipFill rotWithShape="1">
+          <a:blip r:embed="rId5">
+            <a:alphaModFix/>
+          </a:blip>
+          <a:srcRect/>
+          <a:stretch/>
+        </p:blipFill>
+        <p:spPr>
+          <a:xfrm>
+            <a:off x="8166691" y="3995257"/>
+            <a:ext cx="690239" cy="975748"/>
+          </a:xfrm>
+          <a:prstGeom prst="rect">
+            <a:avLst/>
+          </a:prstGeom>
+          <a:noFill/>
+          <a:ln>
+            <a:noFill/>
+          </a:ln>
+        </p:spPr>
+      </p:pic>
+      <p:pic>
+        <p:nvPicPr>
+          <p:cNvPr id="3" name="Picture 2"/>
+          <p:cNvPicPr>
+            <a:picLocks noChangeAspect="1"/>
+          </p:cNvPicPr>
+          <p:nvPr/>
+        </p:nvPicPr>
+        <p:blipFill>
+          <a:blip r:embed="rId6">
+            <a:extLst>
+              <a:ext uri="{28A0092B-C50C-407E-A947-70E740481C1C}">
+                <a14:useLocalDpi xmlns:a14="http://schemas.microsoft.com/office/drawing/2010/main" val="0"/>
+              </a:ext>
+            </a:extLst>
+          </a:blip>
+          <a:stretch>
+            <a:fillRect/>
+          </a:stretch>
+        </p:blipFill>
+        <p:spPr>
+          <a:xfrm>
+            <a:off x="-12748" y="-13118"/>
+            <a:ext cx="1227971" cy="988367"/>
+          </a:xfrm>
+          <a:prstGeom prst="rect">
+            <a:avLst/>
+          </a:prstGeom>
+        </p:spPr>
+      </p:pic>
+      <p:pic>
+        <p:nvPicPr>
+          <p:cNvPr id="5" name="Picture 4"/>
+          <p:cNvPicPr>
+            <a:picLocks noChangeAspect="1"/>
+          </p:cNvPicPr>
+          <p:nvPr/>
+        </p:nvPicPr>
+        <p:blipFill>
+          <a:blip r:embed="rId7">
+            <a:extLst>
+              <a:ext uri="{28A0092B-C50C-407E-A947-70E740481C1C}">
+                <a14:useLocalDpi xmlns:a14="http://schemas.microsoft.com/office/drawing/2010/main" val="0"/>
+              </a:ext>
+            </a:extLst>
+          </a:blip>
+          <a:stretch>
+            <a:fillRect/>
+          </a:stretch>
+        </p:blipFill>
+        <p:spPr>
+          <a:xfrm>
+            <a:off x="385036" y="1642752"/>
+            <a:ext cx="6810375" cy="2324100"/>
+          </a:xfrm>
+          <a:prstGeom prst="rect">
+            <a:avLst/>
+          </a:prstGeom>
+        </p:spPr>
+      </p:pic>
+      <p:sp>
+        <p:nvSpPr>
+          <p:cNvPr id="2" name="TextBox 1"/>
+          <p:cNvSpPr txBox="1"/>
+          <p:nvPr/>
+        </p:nvSpPr>
+        <p:spPr>
+          <a:xfrm>
+            <a:off x="334234" y="1137910"/>
+            <a:ext cx="5507763" cy="461665"/>
+          </a:xfrm>
+          <a:prstGeom prst="rect">
+            <a:avLst/>
+          </a:prstGeom>
+          <a:noFill/>
+        </p:spPr>
+        <p:txBody>
+          <a:bodyPr wrap="square" rtlCol="0">
+            <a:spAutoFit/>
+          </a:bodyPr>
+          <a:lstStyle/>
+          <a:p>
+            <a:r>
+              <a:rPr lang="en-US" sz="2400" dirty="0" smtClean="0">
+                <a:solidFill>
+                  <a:schemeClr val="tx2"/>
+                </a:solidFill>
+                <a:latin typeface="Mark Offc For MC Light" charset="0"/>
+                <a:ea typeface="Mark Offc For MC Light" charset="0"/>
+                <a:cs typeface="Mark Offc For MC Light" charset="0"/>
+              </a:rPr>
+              <a:t>Payment Transactional </a:t>
+            </a:r>
+            <a:r>
+              <a:rPr lang="en-US" sz="2400" dirty="0" smtClean="0">
+                <a:solidFill>
+                  <a:schemeClr val="tx2"/>
+                </a:solidFill>
+                <a:latin typeface="Mark Offc For MC Light" charset="0"/>
+                <a:ea typeface="Mark Offc For MC Light" charset="0"/>
+                <a:cs typeface="Mark Offc For MC Light" charset="0"/>
+              </a:rPr>
+              <a:t>context</a:t>
+            </a:r>
+            <a:endParaRPr lang="en-US" sz="2400" dirty="0">
+              <a:solidFill>
+                <a:schemeClr val="tx2"/>
+              </a:solidFill>
+              <a:latin typeface="Mark Offc For MC Light" charset="0"/>
+              <a:ea typeface="Mark Offc For MC Light" charset="0"/>
+              <a:cs typeface="Mark Offc For MC Light" charset="0"/>
+            </a:endParaRPr>
+          </a:p>
+        </p:txBody>
+      </p:sp>
+      <p:sp>
+        <p:nvSpPr>
+          <p:cNvPr id="9" name="TextBox 8"/>
+          <p:cNvSpPr txBox="1"/>
+          <p:nvPr/>
+        </p:nvSpPr>
+        <p:spPr>
+          <a:xfrm>
+            <a:off x="334235" y="4046587"/>
+            <a:ext cx="5507763" cy="338554"/>
+          </a:xfrm>
+          <a:prstGeom prst="rect">
+            <a:avLst/>
+          </a:prstGeom>
+          <a:noFill/>
+        </p:spPr>
+        <p:txBody>
+          <a:bodyPr wrap="square" rtlCol="0">
+            <a:spAutoFit/>
+          </a:bodyPr>
+          <a:lstStyle/>
+          <a:p>
+            <a:pPr marL="285750" indent="-285750">
+              <a:buFont typeface="Arial" panose="020B0604020202020204" pitchFamily="34" charset="0"/>
+              <a:buChar char="•"/>
+            </a:pPr>
+            <a:r>
+              <a:rPr lang="en-US" sz="1600" dirty="0" smtClean="0">
+                <a:solidFill>
+                  <a:schemeClr val="tx2"/>
+                </a:solidFill>
+                <a:latin typeface="Mark Offc For MC Light" charset="0"/>
+                <a:ea typeface="Mark Offc For MC Light" charset="0"/>
+                <a:cs typeface="Mark Offc For MC Light" charset="0"/>
+              </a:rPr>
+              <a:t>Can be used for any other system/business</a:t>
+            </a:r>
+            <a:endParaRPr lang="en-US" sz="1600" dirty="0">
+              <a:solidFill>
+                <a:schemeClr val="tx2"/>
+              </a:solidFill>
+              <a:latin typeface="Mark Offc For MC Light" charset="0"/>
+              <a:ea typeface="Mark Offc For MC Light" charset="0"/>
+              <a:cs typeface="Mark Offc For MC Light" charset="0"/>
+            </a:endParaRPr>
+          </a:p>
+        </p:txBody>
+      </p:sp>
+    </p:spTree>
+    <p:extLst>
+      <p:ext uri="{BB962C8B-B14F-4D97-AF65-F5344CB8AC3E}">
+        <p14:creationId xmlns:p14="http://schemas.microsoft.com/office/powerpoint/2010/main" val="2826047713"/>
+      </p:ext>
+    </p:extLst>
+  </p:cSld>
+  <p:clrMapOvr>
+    <a:masterClrMapping/>
+  </p:clrMapOvr>
+  <p:transition spd="med">
+    <p:fade/>
+  </p:transition>
+  <p:timing>
+    <p:tnLst>
+      <p:par>
+        <p:cTn id="1" dur="indefinite" restart="never" nodeType="tmRoot"/>
+      </p:par>
+    </p:tnLst>
+  </p:timing>
+</p:sld>
+</file>
+
+<file path=ppt/slides/slide6.xml><?xml version="1.0" encoding="utf-8"?>
+<p:sld xmlns:a="http://schemas.openxmlformats.org/drawingml/2006/main" xmlns:r="http://schemas.openxmlformats.org/officeDocument/2006/relationships" xmlns:p="http://schemas.openxmlformats.org/presentationml/2006/main" showMasterSp="0">
+  <p:cSld>
+    <p:bg>
+      <p:bgPr>
+        <a:blipFill dpi="0" rotWithShape="1">
+          <a:blip r:embed="rId3">
+            <a:lum/>
+          </a:blip>
+          <a:srcRect/>
+          <a:stretch>
+            <a:fillRect l="-1000" r="-1000"/>
+          </a:stretch>
+        </a:blipFill>
+        <a:effectLst/>
+      </p:bgPr>
+    </p:bg>
+    <p:spTree>
+      <p:nvGrpSpPr>
+        <p:cNvPr id="1" name="Shape 133"/>
+        <p:cNvGrpSpPr/>
+        <p:nvPr/>
+      </p:nvGrpSpPr>
+      <p:grpSpPr>
+        <a:xfrm>
+          <a:off x="0" y="0"/>
+          <a:ext cx="0" cy="0"/>
+          <a:chOff x="0" y="0"/>
+          <a:chExt cx="0" cy="0"/>
+        </a:xfrm>
+      </p:grpSpPr>
+      <p:sp>
+        <p:nvSpPr>
+          <p:cNvPr id="134" name="Shape 134"/>
+          <p:cNvSpPr/>
+          <p:nvPr/>
+        </p:nvSpPr>
+        <p:spPr>
+          <a:xfrm>
+            <a:off x="1470534" y="343671"/>
             <a:ext cx="7216266" cy="562703"/>
           </a:xfrm>
           <a:prstGeom prst="rect">
@@ -15259,32 +15903,13 @@
         <p:spPr>
           <a:xfrm>
             <a:off x="80129" y="124481"/>
-            <a:ext cx="1617238" cy="1301680"/>
+            <a:ext cx="1266071" cy="1019033"/>
           </a:xfrm>
           <a:prstGeom prst="rect">
             <a:avLst/>
           </a:prstGeom>
         </p:spPr>
       </p:pic>
-      <p:sp>
-        <p:nvSpPr>
-          <p:cNvPr id="2" name="Title 1"/>
-          <p:cNvSpPr>
-            <a:spLocks noGrp="1"/>
-          </p:cNvSpPr>
-          <p:nvPr>
-            <p:ph type="title"/>
-          </p:nvPr>
-        </p:nvSpPr>
-        <p:spPr/>
-        <p:txBody>
-          <a:bodyPr/>
-          <a:lstStyle/>
-          <a:p>
-            <a:endParaRPr lang="en-US" dirty="0"/>
-          </a:p>
-        </p:txBody>
-      </p:sp>
       <p:sp>
         <p:nvSpPr>
           <p:cNvPr id="4" name="Text Placeholder 3"/>
@@ -15295,7 +15920,12 @@
             <p:ph type="body" idx="1"/>
           </p:nvPr>
         </p:nvSpPr>
-        <p:spPr/>
+        <p:spPr>
+          <a:xfrm>
+            <a:off x="457200" y="1481164"/>
+            <a:ext cx="8229600" cy="3113458"/>
+          </a:xfrm>
+        </p:spPr>
         <p:txBody>
           <a:bodyPr/>
           <a:lstStyle/>
@@ -15304,40 +15934,20 @@
               <a:buClr>
                 <a:schemeClr val="bg1"/>
               </a:buClr>
-              <a:buFont typeface="Wingdings" panose="05000000000000000000" pitchFamily="2" charset="2"/>
-              <a:buChar char="ü"/>
+              <a:buFont typeface="Arial" panose="020B0604020202020204" pitchFamily="34" charset="0"/>
+              <a:buChar char="•"/>
             </a:pPr>
             <a:r>
-              <a:rPr lang="en-US" dirty="0" smtClean="0">
-                <a:solidFill>
-                  <a:schemeClr val="bg1"/>
-                </a:solidFill>
+              <a:rPr lang="en-US" sz="2400" dirty="0" smtClean="0">
+                <a:solidFill>
+                  <a:schemeClr val="tx2"/>
+                </a:solidFill>
+                <a:latin typeface="Mark Offc For MC Light" charset="0"/>
+                <a:ea typeface="Mark Offc For MC Light" charset="0"/>
+                <a:cs typeface="Mark Offc For MC Light" charset="0"/>
+                <a:sym typeface="Arial"/>
               </a:rPr>
-              <a:t>Define </a:t>
-            </a:r>
-            <a:r>
-              <a:rPr lang="en-US" smtClean="0">
-                <a:solidFill>
-                  <a:schemeClr val="bg1"/>
-                </a:solidFill>
-              </a:rPr>
-              <a:t>Business </a:t>
-            </a:r>
-            <a:r>
-              <a:rPr lang="en-US" smtClean="0">
-                <a:solidFill>
-                  <a:schemeClr val="bg1"/>
-                </a:solidFill>
-              </a:rPr>
-              <a:t>Rule </a:t>
-            </a:r>
-            <a:r>
-              <a:rPr lang="en-US" dirty="0" smtClean="0">
-                <a:solidFill>
-                  <a:schemeClr val="bg1"/>
-                </a:solidFill>
-              </a:rPr>
-              <a:t>from GUI based tool.</a:t>
+              <a:t> Define Business Rules from GUI based tool</a:t>
             </a:r>
           </a:p>
           <a:p>
@@ -15345,46 +15955,20 @@
               <a:buClr>
                 <a:schemeClr val="bg1"/>
               </a:buClr>
-              <a:buFont typeface="Wingdings" panose="05000000000000000000" pitchFamily="2" charset="2"/>
-              <a:buChar char="ü"/>
+              <a:buFont typeface="Arial" panose="020B0604020202020204" pitchFamily="34" charset="0"/>
+              <a:buChar char="•"/>
             </a:pPr>
             <a:r>
-              <a:rPr lang="en-US" dirty="0" smtClean="0">
-                <a:solidFill>
-                  <a:schemeClr val="bg1"/>
-                </a:solidFill>
+              <a:rPr lang="en-US" sz="2400" dirty="0" smtClean="0">
+                <a:solidFill>
+                  <a:schemeClr val="tx2"/>
+                </a:solidFill>
+                <a:latin typeface="Mark Offc For MC Light" charset="0"/>
+                <a:ea typeface="Mark Offc For MC Light" charset="0"/>
+                <a:cs typeface="Mark Offc For MC Light" charset="0"/>
+                <a:sym typeface="Arial"/>
               </a:rPr>
-              <a:t>Define Validity period of </a:t>
-            </a:r>
-            <a:r>
-              <a:rPr lang="en-US" dirty="0" err="1" smtClean="0">
-                <a:solidFill>
-                  <a:schemeClr val="bg1"/>
-                </a:solidFill>
-              </a:rPr>
-              <a:t>BusinessRule</a:t>
-            </a:r>
-            <a:endParaRPr lang="en-US" dirty="0" smtClean="0">
-              <a:solidFill>
-                <a:schemeClr val="bg1"/>
-              </a:solidFill>
-            </a:endParaRPr>
-          </a:p>
-          <a:p>
-            <a:pPr>
-              <a:buClr>
-                <a:schemeClr val="bg1"/>
-              </a:buClr>
-              <a:buFont typeface="Wingdings" panose="05000000000000000000" pitchFamily="2" charset="2"/>
-              <a:buChar char="ü"/>
-            </a:pPr>
-            <a:r>
-              <a:rPr lang="en-US" dirty="0" smtClean="0">
-                <a:solidFill>
-                  <a:schemeClr val="bg1"/>
-                </a:solidFill>
-              </a:rPr>
-              <a:t>Export Rule-based file in Web Application.</a:t>
+              <a:t> Define Validity period of Business Rule</a:t>
             </a:r>
           </a:p>
           <a:p>
@@ -15392,16 +15976,20 @@
               <a:buClr>
                 <a:schemeClr val="bg1"/>
               </a:buClr>
-              <a:buFont typeface="Wingdings" panose="05000000000000000000" pitchFamily="2" charset="2"/>
-              <a:buChar char="ü"/>
+              <a:buFont typeface="Arial" panose="020B0604020202020204" pitchFamily="34" charset="0"/>
+              <a:buChar char="•"/>
             </a:pPr>
             <a:r>
-              <a:rPr lang="en-US" dirty="0" smtClean="0">
-                <a:solidFill>
-                  <a:schemeClr val="bg1"/>
-                </a:solidFill>
+              <a:rPr lang="en-US" sz="2400" dirty="0" smtClean="0">
+                <a:solidFill>
+                  <a:schemeClr val="tx2"/>
+                </a:solidFill>
+                <a:latin typeface="Mark Offc For MC Light" charset="0"/>
+                <a:ea typeface="Mark Offc For MC Light" charset="0"/>
+                <a:cs typeface="Mark Offc For MC Light" charset="0"/>
+                <a:sym typeface="Arial"/>
               </a:rPr>
-              <a:t>Load file on every change.</a:t>
+              <a:t> Export Rule-based file in REST service</a:t>
             </a:r>
           </a:p>
           <a:p>
@@ -15409,16 +15997,20 @@
               <a:buClr>
                 <a:schemeClr val="bg1"/>
               </a:buClr>
-              <a:buFont typeface="Wingdings" panose="05000000000000000000" pitchFamily="2" charset="2"/>
-              <a:buChar char="ü"/>
+              <a:buFont typeface="Arial" panose="020B0604020202020204" pitchFamily="34" charset="0"/>
+              <a:buChar char="•"/>
             </a:pPr>
             <a:r>
-              <a:rPr lang="en-US" dirty="0" smtClean="0">
-                <a:solidFill>
-                  <a:schemeClr val="bg1"/>
-                </a:solidFill>
+              <a:rPr lang="en-US" sz="2400" dirty="0" smtClean="0">
+                <a:solidFill>
+                  <a:schemeClr val="tx2"/>
+                </a:solidFill>
+                <a:latin typeface="Mark Offc For MC Light" charset="0"/>
+                <a:ea typeface="Mark Offc For MC Light" charset="0"/>
+                <a:cs typeface="Mark Offc For MC Light" charset="0"/>
+                <a:sym typeface="Arial"/>
               </a:rPr>
-              <a:t>REST API call will invoke loaded file.</a:t>
+              <a:t> REST API service will refer loaded workflow file and workflow will get executed.</a:t>
             </a:r>
           </a:p>
           <a:p>
@@ -15426,16 +16018,20 @@
               <a:buClr>
                 <a:schemeClr val="bg1"/>
               </a:buClr>
-              <a:buFont typeface="Wingdings" panose="05000000000000000000" pitchFamily="2" charset="2"/>
-              <a:buChar char="ü"/>
+              <a:buFont typeface="Arial" panose="020B0604020202020204" pitchFamily="34" charset="0"/>
+              <a:buChar char="•"/>
             </a:pPr>
             <a:r>
-              <a:rPr lang="en-US" dirty="0" smtClean="0">
-                <a:solidFill>
-                  <a:schemeClr val="bg1"/>
-                </a:solidFill>
+              <a:rPr lang="en-US" sz="2400" dirty="0" smtClean="0">
+                <a:solidFill>
+                  <a:schemeClr val="tx2"/>
+                </a:solidFill>
+                <a:latin typeface="Mark Offc For MC Light" charset="0"/>
+                <a:ea typeface="Mark Offc For MC Light" charset="0"/>
+                <a:cs typeface="Mark Offc For MC Light" charset="0"/>
+                <a:sym typeface="Arial"/>
               </a:rPr>
-              <a:t>Application will only call REST API.</a:t>
+              <a:t> Application that will implement this solution will only have to call up REST API Service.</a:t>
             </a:r>
           </a:p>
           <a:p>
@@ -15476,13 +16072,13 @@
 </p:sld>
 </file>
 
-<file path=ppt/slides/slide6.xml><?xml version="1.0" encoding="utf-8"?>
+<file path=ppt/slides/slide7.xml><?xml version="1.0" encoding="utf-8"?>
 <p:sld xmlns:a="http://schemas.openxmlformats.org/drawingml/2006/main" xmlns:r="http://schemas.openxmlformats.org/officeDocument/2006/relationships" xmlns:p="http://schemas.openxmlformats.org/presentationml/2006/main" showMasterSp="0">
   <p:cSld>
     <p:bg>
       <p:bgPr>
         <a:blipFill dpi="0" rotWithShape="1">
-          <a:blip r:embed="rId3">
+          <a:blip r:embed="rId4">
             <a:lum/>
           </a:blip>
           <a:srcRect/>
@@ -15515,7 +16111,7 @@
         </p:nvSpPr>
         <p:spPr>
           <a:xfrm>
-            <a:off x="1527685" y="521471"/>
+            <a:off x="1470534" y="337321"/>
             <a:ext cx="7216266" cy="562703"/>
           </a:xfrm>
           <a:prstGeom prst="rect">
@@ -15540,7 +16136,7 @@
               <a:buNone/>
             </a:pPr>
             <a:r>
-              <a:rPr lang="en-US" sz="2800" dirty="0" smtClean="0">
+              <a:rPr lang="en-US" sz="2400" dirty="0" smtClean="0">
                 <a:solidFill>
                   <a:schemeClr val="tx2"/>
                 </a:solidFill>
@@ -15549,376 +16145,8 @@
                 <a:cs typeface="Mark Offc For MC Light" charset="0"/>
                 <a:sym typeface="Calibri"/>
               </a:rPr>
-              <a:t>How to Implement Your Solution?</a:t>
+              <a:t>What are the </a:t>
             </a:r>
-            <a:endParaRPr lang="en-US" sz="2800" dirty="0">
-              <a:solidFill>
-                <a:schemeClr val="tx2"/>
-              </a:solidFill>
-              <a:latin typeface="Mark Offc For MC Light" charset="0"/>
-              <a:ea typeface="Mark Offc For MC Light" charset="0"/>
-              <a:cs typeface="Mark Offc For MC Light" charset="0"/>
-              <a:sym typeface="Calibri"/>
-            </a:endParaRPr>
-          </a:p>
-        </p:txBody>
-      </p:sp>
-      <p:sp>
-        <p:nvSpPr>
-          <p:cNvPr id="135" name="Shape 135"/>
-          <p:cNvSpPr/>
-          <p:nvPr/>
-        </p:nvSpPr>
-        <p:spPr>
-          <a:xfrm>
-            <a:off x="491313" y="1203245"/>
-            <a:ext cx="7738288" cy="3550595"/>
-          </a:xfrm>
-          <a:prstGeom prst="rect">
-            <a:avLst/>
-          </a:prstGeom>
-          <a:noFill/>
-          <a:ln>
-            <a:noFill/>
-          </a:ln>
-        </p:spPr>
-        <p:txBody>
-          <a:bodyPr lIns="65250" tIns="65250" rIns="65250" bIns="65250" anchor="t" anchorCtr="0">
-            <a:noAutofit/>
-          </a:bodyPr>
-          <a:lstStyle/>
-          <a:p>
-            <a:pPr lvl="0">
-              <a:buSzPct val="25000"/>
-            </a:pPr>
-            <a:endParaRPr lang="en-US" sz="1600" dirty="0" smtClean="0">
-              <a:solidFill>
-                <a:schemeClr val="tx2"/>
-              </a:solidFill>
-              <a:latin typeface="Mark Offc For MC Light" charset="0"/>
-              <a:ea typeface="Mark Offc For MC Light" charset="0"/>
-              <a:cs typeface="Mark Offc For MC Light" charset="0"/>
-              <a:sym typeface="Calibri"/>
-            </a:endParaRPr>
-          </a:p>
-          <a:p>
-            <a:pPr marL="0" marR="0" lvl="0" indent="0" rtl="0">
-              <a:spcBef>
-                <a:spcPts val="0"/>
-              </a:spcBef>
-              <a:buNone/>
-            </a:pPr>
-            <a:endParaRPr sz="1100" dirty="0">
-              <a:solidFill>
-                <a:schemeClr val="tx2"/>
-              </a:solidFill>
-              <a:latin typeface="Mark Offc For MC Light" charset="0"/>
-              <a:ea typeface="Mark Offc For MC Light" charset="0"/>
-              <a:cs typeface="Mark Offc For MC Light" charset="0"/>
-              <a:sym typeface="Calibri"/>
-            </a:endParaRPr>
-          </a:p>
-        </p:txBody>
-      </p:sp>
-      <p:pic>
-        <p:nvPicPr>
-          <p:cNvPr id="7" name="Picture 6"/>
-          <p:cNvPicPr>
-            <a:picLocks noChangeAspect="1"/>
-          </p:cNvPicPr>
-          <p:nvPr/>
-        </p:nvPicPr>
-        <p:blipFill>
-          <a:blip r:embed="rId4">
-            <a:extLst>
-              <a:ext uri="{28A0092B-C50C-407E-A947-70E740481C1C}">
-                <a14:useLocalDpi xmlns:a14="http://schemas.microsoft.com/office/drawing/2010/main" val="0"/>
-              </a:ext>
-            </a:extLst>
-          </a:blip>
-          <a:stretch>
-            <a:fillRect/>
-          </a:stretch>
-        </p:blipFill>
-        <p:spPr>
-          <a:xfrm>
-            <a:off x="222080" y="4753840"/>
-            <a:ext cx="993143" cy="227996"/>
-          </a:xfrm>
-          <a:prstGeom prst="rect">
-            <a:avLst/>
-          </a:prstGeom>
-        </p:spPr>
-      </p:pic>
-      <p:pic>
-        <p:nvPicPr>
-          <p:cNvPr id="8" name="Shape 110"/>
-          <p:cNvPicPr preferRelativeResize="0"/>
-          <p:nvPr/>
-        </p:nvPicPr>
-        <p:blipFill rotWithShape="1">
-          <a:blip r:embed="rId5">
-            <a:alphaModFix/>
-          </a:blip>
-          <a:srcRect/>
-          <a:stretch/>
-        </p:blipFill>
-        <p:spPr>
-          <a:xfrm>
-            <a:off x="8166691" y="3995257"/>
-            <a:ext cx="690239" cy="975748"/>
-          </a:xfrm>
-          <a:prstGeom prst="rect">
-            <a:avLst/>
-          </a:prstGeom>
-          <a:noFill/>
-          <a:ln>
-            <a:noFill/>
-          </a:ln>
-        </p:spPr>
-      </p:pic>
-      <p:pic>
-        <p:nvPicPr>
-          <p:cNvPr id="3" name="Picture 2"/>
-          <p:cNvPicPr>
-            <a:picLocks noChangeAspect="1"/>
-          </p:cNvPicPr>
-          <p:nvPr/>
-        </p:nvPicPr>
-        <p:blipFill>
-          <a:blip r:embed="rId6">
-            <a:extLst>
-              <a:ext uri="{28A0092B-C50C-407E-A947-70E740481C1C}">
-                <a14:useLocalDpi xmlns:a14="http://schemas.microsoft.com/office/drawing/2010/main" val="0"/>
-              </a:ext>
-            </a:extLst>
-          </a:blip>
-          <a:stretch>
-            <a:fillRect/>
-          </a:stretch>
-        </p:blipFill>
-        <p:spPr>
-          <a:xfrm>
-            <a:off x="80129" y="124481"/>
-            <a:ext cx="1617238" cy="1301680"/>
-          </a:xfrm>
-          <a:prstGeom prst="rect">
-            <a:avLst/>
-          </a:prstGeom>
-        </p:spPr>
-      </p:pic>
-      <p:sp>
-        <p:nvSpPr>
-          <p:cNvPr id="2" name="Title 1"/>
-          <p:cNvSpPr>
-            <a:spLocks noGrp="1"/>
-          </p:cNvSpPr>
-          <p:nvPr>
-            <p:ph type="title"/>
-          </p:nvPr>
-        </p:nvSpPr>
-        <p:spPr/>
-        <p:txBody>
-          <a:bodyPr/>
-          <a:lstStyle/>
-          <a:p>
-            <a:endParaRPr lang="en-US" dirty="0"/>
-          </a:p>
-        </p:txBody>
-      </p:sp>
-      <p:sp>
-        <p:nvSpPr>
-          <p:cNvPr id="4" name="Text Placeholder 3"/>
-          <p:cNvSpPr>
-            <a:spLocks noGrp="1"/>
-          </p:cNvSpPr>
-          <p:nvPr>
-            <p:ph type="body" idx="1"/>
-          </p:nvPr>
-        </p:nvSpPr>
-        <p:spPr/>
-        <p:txBody>
-          <a:bodyPr/>
-          <a:lstStyle/>
-          <a:p>
-            <a:r>
-              <a:rPr lang="en-US" dirty="0" smtClean="0">
-                <a:solidFill>
-                  <a:schemeClr val="bg1"/>
-                </a:solidFill>
-              </a:rPr>
-              <a:t>Define Business Rule in from GUI based tool.</a:t>
-            </a:r>
-          </a:p>
-          <a:p>
-            <a:r>
-              <a:rPr lang="en-US" dirty="0" smtClean="0">
-                <a:solidFill>
-                  <a:schemeClr val="bg1"/>
-                </a:solidFill>
-              </a:rPr>
-              <a:t>Define Validity period of </a:t>
-            </a:r>
-            <a:r>
-              <a:rPr lang="en-US" dirty="0" err="1" smtClean="0">
-                <a:solidFill>
-                  <a:schemeClr val="bg1"/>
-                </a:solidFill>
-              </a:rPr>
-              <a:t>BusinessRule</a:t>
-            </a:r>
-            <a:endParaRPr lang="en-US" dirty="0" smtClean="0">
-              <a:solidFill>
-                <a:schemeClr val="bg1"/>
-              </a:solidFill>
-            </a:endParaRPr>
-          </a:p>
-          <a:p>
-            <a:r>
-              <a:rPr lang="en-US" dirty="0" smtClean="0">
-                <a:solidFill>
-                  <a:schemeClr val="bg1"/>
-                </a:solidFill>
-              </a:rPr>
-              <a:t>Export Rule-based file in Web Application.</a:t>
-            </a:r>
-          </a:p>
-          <a:p>
-            <a:r>
-              <a:rPr lang="en-US" dirty="0" smtClean="0">
-                <a:solidFill>
-                  <a:schemeClr val="bg1"/>
-                </a:solidFill>
-              </a:rPr>
-              <a:t>Load file on every change.</a:t>
-            </a:r>
-          </a:p>
-          <a:p>
-            <a:r>
-              <a:rPr lang="en-US" dirty="0" smtClean="0">
-                <a:solidFill>
-                  <a:schemeClr val="bg1"/>
-                </a:solidFill>
-              </a:rPr>
-              <a:t>REST API call will invoke loaded file.</a:t>
-            </a:r>
-          </a:p>
-          <a:p>
-            <a:r>
-              <a:rPr lang="en-US" dirty="0" smtClean="0">
-                <a:solidFill>
-                  <a:schemeClr val="bg1"/>
-                </a:solidFill>
-              </a:rPr>
-              <a:t>Application will only call REST API.</a:t>
-            </a:r>
-          </a:p>
-          <a:p>
-            <a:pPr marL="203200" indent="0">
-              <a:buNone/>
-            </a:pPr>
-            <a:r>
-              <a:rPr lang="en-US" dirty="0" smtClean="0">
-                <a:solidFill>
-                  <a:schemeClr val="bg1"/>
-                </a:solidFill>
-              </a:rPr>
-              <a:t>  </a:t>
-            </a:r>
-            <a:endParaRPr lang="en-US" dirty="0">
-              <a:solidFill>
-                <a:schemeClr val="bg1"/>
-              </a:solidFill>
-            </a:endParaRPr>
-          </a:p>
-        </p:txBody>
-      </p:sp>
-    </p:spTree>
-    <p:extLst>
-      <p:ext uri="{BB962C8B-B14F-4D97-AF65-F5344CB8AC3E}">
-        <p14:creationId xmlns:p14="http://schemas.microsoft.com/office/powerpoint/2010/main" val="2826047713"/>
-      </p:ext>
-    </p:extLst>
-  </p:cSld>
-  <p:clrMapOvr>
-    <a:masterClrMapping/>
-  </p:clrMapOvr>
-  <p:transition spd="med">
-    <p:fade/>
-  </p:transition>
-  <p:timing>
-    <p:tnLst>
-      <p:par>
-        <p:cTn id="1" dur="indefinite" restart="never" nodeType="tmRoot"/>
-      </p:par>
-    </p:tnLst>
-  </p:timing>
-</p:sld>
-</file>
-
-<file path=ppt/slides/slide7.xml><?xml version="1.0" encoding="utf-8"?>
-<p:sld xmlns:a="http://schemas.openxmlformats.org/drawingml/2006/main" xmlns:r="http://schemas.openxmlformats.org/officeDocument/2006/relationships" xmlns:p="http://schemas.openxmlformats.org/presentationml/2006/main" showMasterSp="0">
-  <p:cSld>
-    <p:bg>
-      <p:bgPr>
-        <a:blipFill dpi="0" rotWithShape="1">
-          <a:blip r:embed="rId3">
-            <a:lum/>
-          </a:blip>
-          <a:srcRect/>
-          <a:stretch>
-            <a:fillRect l="-1000" r="-1000"/>
-          </a:stretch>
-        </a:blipFill>
-        <a:effectLst/>
-      </p:bgPr>
-    </p:bg>
-    <p:spTree>
-      <p:nvGrpSpPr>
-        <p:cNvPr id="1" name="Shape 133"/>
-        <p:cNvGrpSpPr/>
-        <p:nvPr/>
-      </p:nvGrpSpPr>
-      <p:grpSpPr>
-        <a:xfrm>
-          <a:off x="0" y="0"/>
-          <a:ext cx="0" cy="0"/>
-          <a:chOff x="0" y="0"/>
-          <a:chExt cx="0" cy="0"/>
-        </a:xfrm>
-      </p:grpSpPr>
-      <p:sp>
-        <p:nvSpPr>
-          <p:cNvPr id="134" name="Shape 134"/>
-          <p:cNvSpPr/>
-          <p:nvPr/>
-        </p:nvSpPr>
-        <p:spPr>
-          <a:xfrm>
-            <a:off x="1527685" y="521471"/>
-            <a:ext cx="7216266" cy="562703"/>
-          </a:xfrm>
-          <a:prstGeom prst="rect">
-            <a:avLst/>
-          </a:prstGeom>
-          <a:noFill/>
-          <a:ln>
-            <a:noFill/>
-          </a:ln>
-        </p:spPr>
-        <p:txBody>
-          <a:bodyPr lIns="65250" tIns="65250" rIns="65250" bIns="65250" anchor="ctr" anchorCtr="0">
-            <a:noAutofit/>
-          </a:bodyPr>
-          <a:lstStyle/>
-          <a:p>
-            <a:pPr marL="0" marR="0" lvl="0" indent="0" rtl="0">
-              <a:spcBef>
-                <a:spcPts val="0"/>
-              </a:spcBef>
-              <a:buSzPct val="25000"/>
-              <a:buNone/>
-            </a:pPr>
             <a:r>
               <a:rPr lang="en-US" sz="2400" dirty="0" smtClean="0">
                 <a:solidFill>
@@ -15929,7 +16157,7 @@
                 <a:cs typeface="Mark Offc For MC Light" charset="0"/>
                 <a:sym typeface="Calibri"/>
               </a:rPr>
-              <a:t>What are the Risks/Issues for GoToMarket ?</a:t>
+              <a:t>GoToMarket strategies ?</a:t>
             </a:r>
             <a:endParaRPr lang="en-US" sz="2400" dirty="0">
               <a:solidFill>
@@ -16009,7 +16237,7 @@
           <p:nvPr/>
         </p:nvPicPr>
         <p:blipFill>
-          <a:blip r:embed="rId4">
+          <a:blip r:embed="rId5">
             <a:extLst>
               <a:ext uri="{28A0092B-C50C-407E-A947-70E740481C1C}">
                 <a14:useLocalDpi xmlns:a14="http://schemas.microsoft.com/office/drawing/2010/main" val="0"/>
@@ -16037,7 +16265,7 @@
           <p:nvPr/>
         </p:nvPicPr>
         <p:blipFill rotWithShape="1">
-          <a:blip r:embed="rId5">
+          <a:blip r:embed="rId6">
             <a:alphaModFix/>
           </a:blip>
           <a:srcRect/>
@@ -16066,7 +16294,7 @@
           <p:nvPr/>
         </p:nvPicPr>
         <p:blipFill>
-          <a:blip r:embed="rId6">
+          <a:blip r:embed="rId7">
             <a:extLst>
               <a:ext uri="{28A0092B-C50C-407E-A947-70E740481C1C}">
                 <a14:useLocalDpi xmlns:a14="http://schemas.microsoft.com/office/drawing/2010/main" val="0"/>
@@ -16080,32 +16308,13 @@
         <p:spPr>
           <a:xfrm>
             <a:off x="80129" y="151982"/>
-            <a:ext cx="1617238" cy="1301680"/>
+            <a:ext cx="1183521" cy="952591"/>
           </a:xfrm>
           <a:prstGeom prst="rect">
             <a:avLst/>
           </a:prstGeom>
         </p:spPr>
       </p:pic>
-      <p:sp>
-        <p:nvSpPr>
-          <p:cNvPr id="2" name="Title 1"/>
-          <p:cNvSpPr>
-            <a:spLocks noGrp="1"/>
-          </p:cNvSpPr>
-          <p:nvPr>
-            <p:ph type="title"/>
-          </p:nvPr>
-        </p:nvSpPr>
-        <p:spPr/>
-        <p:txBody>
-          <a:bodyPr/>
-          <a:lstStyle/>
-          <a:p>
-            <a:endParaRPr lang="en-US"/>
-          </a:p>
-        </p:txBody>
-      </p:sp>
       <p:sp>
         <p:nvSpPr>
           <p:cNvPr id="4" name="Text Placeholder 3"/>
@@ -16116,12 +16325,133 @@
             <p:ph type="body" idx="1"/>
           </p:nvPr>
         </p:nvSpPr>
-        <p:spPr/>
+        <p:spPr>
+          <a:xfrm>
+            <a:off x="457200" y="1200150"/>
+            <a:ext cx="8229600" cy="3092450"/>
+          </a:xfrm>
+        </p:spPr>
         <p:txBody>
           <a:bodyPr/>
           <a:lstStyle/>
           <a:p>
-            <a:endParaRPr lang="en-US" dirty="0"/>
+            <a:pPr>
+              <a:buClr>
+                <a:schemeClr val="bg1"/>
+              </a:buClr>
+            </a:pPr>
+            <a:r>
+              <a:rPr lang="en-US" sz="2400" dirty="0" smtClean="0">
+                <a:solidFill>
+                  <a:schemeClr val="tx2"/>
+                </a:solidFill>
+                <a:latin typeface="Mark Offc For MC Light" charset="0"/>
+                <a:ea typeface="Mark Offc For MC Light" charset="0"/>
+                <a:cs typeface="Mark Offc For MC Light" charset="0"/>
+                <a:sym typeface="Arial"/>
+              </a:rPr>
+              <a:t> Early market captures will benefit business revenue  </a:t>
+            </a:r>
+          </a:p>
+          <a:p>
+            <a:endParaRPr lang="en-US" sz="2400" dirty="0" smtClean="0">
+              <a:solidFill>
+                <a:schemeClr val="tx2"/>
+              </a:solidFill>
+              <a:latin typeface="Mark Offc For MC Light" charset="0"/>
+              <a:ea typeface="Mark Offc For MC Light" charset="0"/>
+              <a:cs typeface="Mark Offc For MC Light" charset="0"/>
+              <a:sym typeface="Arial"/>
+            </a:endParaRPr>
+          </a:p>
+          <a:p>
+            <a:pPr>
+              <a:buClr>
+                <a:schemeClr val="bg1"/>
+              </a:buClr>
+            </a:pPr>
+            <a:r>
+              <a:rPr lang="en-US" sz="2400" dirty="0" smtClean="0">
+                <a:solidFill>
+                  <a:schemeClr val="tx2"/>
+                </a:solidFill>
+                <a:latin typeface="Mark Offc For MC Light" charset="0"/>
+                <a:ea typeface="Mark Offc For MC Light" charset="0"/>
+                <a:cs typeface="Mark Offc For MC Light" charset="0"/>
+                <a:sym typeface="Arial"/>
+              </a:rPr>
+              <a:t> Reduces </a:t>
+            </a:r>
+            <a:r>
+              <a:rPr lang="en-US" sz="2400" dirty="0">
+                <a:solidFill>
+                  <a:schemeClr val="tx2"/>
+                </a:solidFill>
+                <a:latin typeface="Mark Offc For MC Light" charset="0"/>
+                <a:ea typeface="Mark Offc For MC Light" charset="0"/>
+                <a:cs typeface="Mark Offc For MC Light" charset="0"/>
+                <a:sym typeface="Arial"/>
+              </a:rPr>
+              <a:t>time to implement the </a:t>
+            </a:r>
+            <a:r>
+              <a:rPr lang="en-US" sz="2400" dirty="0" smtClean="0">
+                <a:solidFill>
+                  <a:schemeClr val="tx2"/>
+                </a:solidFill>
+                <a:latin typeface="Mark Offc For MC Light" charset="0"/>
+                <a:ea typeface="Mark Offc For MC Light" charset="0"/>
+                <a:cs typeface="Mark Offc For MC Light" charset="0"/>
+                <a:sym typeface="Arial"/>
+              </a:rPr>
+              <a:t>change</a:t>
+            </a:r>
+          </a:p>
+          <a:p>
+            <a:pPr>
+              <a:buClr>
+                <a:schemeClr val="bg1"/>
+              </a:buClr>
+            </a:pPr>
+            <a:endParaRPr lang="en-US" sz="2400" dirty="0" smtClean="0">
+              <a:solidFill>
+                <a:schemeClr val="tx2"/>
+              </a:solidFill>
+              <a:latin typeface="Mark Offc For MC Light" charset="0"/>
+              <a:ea typeface="Mark Offc For MC Light" charset="0"/>
+              <a:cs typeface="Mark Offc For MC Light" charset="0"/>
+              <a:sym typeface="Arial"/>
+            </a:endParaRPr>
+          </a:p>
+          <a:p>
+            <a:pPr>
+              <a:buClr>
+                <a:schemeClr val="bg1"/>
+              </a:buClr>
+            </a:pPr>
+            <a:r>
+              <a:rPr lang="en-US" sz="2400" dirty="0" smtClean="0">
+                <a:solidFill>
+                  <a:schemeClr val="tx2"/>
+                </a:solidFill>
+                <a:latin typeface="Mark Offc For MC Light" charset="0"/>
+                <a:ea typeface="Mark Offc For MC Light" charset="0"/>
+                <a:cs typeface="Mark Offc For MC Light" charset="0"/>
+                <a:sym typeface="Arial"/>
+              </a:rPr>
+              <a:t> Saved time will be utilized developing new features in product</a:t>
+            </a:r>
+          </a:p>
+          <a:p>
+            <a:endParaRPr lang="en-US" sz="2400" dirty="0">
+              <a:solidFill>
+                <a:schemeClr val="tx2"/>
+              </a:solidFill>
+              <a:latin typeface="Mark Offc For MC Light" charset="0"/>
+              <a:ea typeface="Mark Offc For MC Light" charset="0"/>
+              <a:cs typeface="Mark Offc For MC Light" charset="0"/>
+              <a:sym typeface="Arial"/>
+            </a:endParaRPr>
           </a:p>
         </p:txBody>
       </p:sp>
@@ -16133,7 +16463,7 @@
     </p:extLst>
   </p:cSld>
   <p:clrMapOvr>
-    <a:masterClrMapping/>
+    <a:overrideClrMapping bg1="lt1" tx1="dk1" bg2="dk2" tx2="lt2" accent1="accent1" accent2="accent2" accent3="accent3" accent4="accent4" accent5="accent5" accent6="accent6" hlink="hlink" folHlink="folHlink"/>
   </p:clrMapOvr>
   <p:transition spd="med">
     <p:fade/>
@@ -16993,4 +17323,47 @@
     </a:folHlink>
   </a:clrScheme>
 </a:themeOverride>
+</file>
+
+<file path=ppt/theme/themeOverride3.xml><?xml version="1.0" encoding="utf-8"?>
+<a:themeOverride xmlns:a="http://schemas.openxmlformats.org/drawingml/2006/main">
+  <a:clrScheme name="Custom 5">
+    <a:dk1>
+      <a:srgbClr val="000000"/>
+    </a:dk1>
+    <a:lt1>
+      <a:srgbClr val="FFFFFF"/>
+    </a:lt1>
+    <a:dk2>
+      <a:srgbClr val="1F497D"/>
+    </a:dk2>
+    <a:lt2>
+      <a:srgbClr val="EEECE1"/>
+    </a:lt2>
+    <a:accent1>
+      <a:srgbClr val="4F81BD"/>
+    </a:accent1>
+    <a:accent2>
+      <a:srgbClr val="C0504D"/>
+    </a:accent2>
+    <a:accent3>
+      <a:srgbClr val="9BBB59"/>
+    </a:accent3>
+    <a:accent4>
+      <a:srgbClr val="8064A2"/>
+    </a:accent4>
+    <a:accent5>
+      <a:srgbClr val="4BACC6"/>
+    </a:accent5>
+    <a:accent6>
+      <a:srgbClr val="F79646"/>
+    </a:accent6>
+    <a:hlink>
+      <a:srgbClr val="FF0000"/>
+    </a:hlink>
+    <a:folHlink>
+      <a:srgbClr val="FF0000"/>
+    </a:folHlink>
+  </a:clrScheme>
+</a:themeOverride>
 </file>
</xml_diff>